<commit_message>
added a question to KNN exercises
</commit_message>
<xml_diff>
--- a/cs1675_rec5_sept28.pptx
+++ b/cs1675_rec5_sept28.pptx
@@ -229,7 +229,7 @@
           <a:p>
             <a:fld id="{79DACF82-7282-4538-9925-81D795D18BF0}" type="datetimeFigureOut">
               <a:rPr lang="en-US" smtClean="0"/>
-              <a:t>9/27/2018</a:t>
+              <a:t>9/28/2018</a:t>
             </a:fld>
             <a:endParaRPr lang="en-US"/>
           </a:p>
@@ -963,7 +963,7 @@
           <a:p>
             <a:fld id="{7880F47B-3C72-48E5-9CD2-8B9AE0E9AFF7}" type="datetimeFigureOut">
               <a:rPr lang="en-US" smtClean="0"/>
-              <a:t>9/27/2018</a:t>
+              <a:t>9/28/2018</a:t>
             </a:fld>
             <a:endParaRPr lang="en-US"/>
           </a:p>
@@ -1133,7 +1133,7 @@
           <a:p>
             <a:fld id="{7880F47B-3C72-48E5-9CD2-8B9AE0E9AFF7}" type="datetimeFigureOut">
               <a:rPr lang="en-US" smtClean="0"/>
-              <a:t>9/27/2018</a:t>
+              <a:t>9/28/2018</a:t>
             </a:fld>
             <a:endParaRPr lang="en-US"/>
           </a:p>
@@ -1313,7 +1313,7 @@
           <a:p>
             <a:fld id="{7880F47B-3C72-48E5-9CD2-8B9AE0E9AFF7}" type="datetimeFigureOut">
               <a:rPr lang="en-US" smtClean="0"/>
-              <a:t>9/27/2018</a:t>
+              <a:t>9/28/2018</a:t>
             </a:fld>
             <a:endParaRPr lang="en-US"/>
           </a:p>
@@ -1483,7 +1483,7 @@
           <a:p>
             <a:fld id="{7880F47B-3C72-48E5-9CD2-8B9AE0E9AFF7}" type="datetimeFigureOut">
               <a:rPr lang="en-US" smtClean="0"/>
-              <a:t>9/27/2018</a:t>
+              <a:t>9/28/2018</a:t>
             </a:fld>
             <a:endParaRPr lang="en-US"/>
           </a:p>
@@ -1727,7 +1727,7 @@
           <a:p>
             <a:fld id="{7880F47B-3C72-48E5-9CD2-8B9AE0E9AFF7}" type="datetimeFigureOut">
               <a:rPr lang="en-US" smtClean="0"/>
-              <a:t>9/27/2018</a:t>
+              <a:t>9/28/2018</a:t>
             </a:fld>
             <a:endParaRPr lang="en-US"/>
           </a:p>
@@ -1959,7 +1959,7 @@
           <a:p>
             <a:fld id="{7880F47B-3C72-48E5-9CD2-8B9AE0E9AFF7}" type="datetimeFigureOut">
               <a:rPr lang="en-US" smtClean="0"/>
-              <a:t>9/27/2018</a:t>
+              <a:t>9/28/2018</a:t>
             </a:fld>
             <a:endParaRPr lang="en-US"/>
           </a:p>
@@ -2326,7 +2326,7 @@
           <a:p>
             <a:fld id="{7880F47B-3C72-48E5-9CD2-8B9AE0E9AFF7}" type="datetimeFigureOut">
               <a:rPr lang="en-US" smtClean="0"/>
-              <a:t>9/27/2018</a:t>
+              <a:t>9/28/2018</a:t>
             </a:fld>
             <a:endParaRPr lang="en-US"/>
           </a:p>
@@ -2444,7 +2444,7 @@
           <a:p>
             <a:fld id="{7880F47B-3C72-48E5-9CD2-8B9AE0E9AFF7}" type="datetimeFigureOut">
               <a:rPr lang="en-US" smtClean="0"/>
-              <a:t>9/27/2018</a:t>
+              <a:t>9/28/2018</a:t>
             </a:fld>
             <a:endParaRPr lang="en-US"/>
           </a:p>
@@ -2539,7 +2539,7 @@
           <a:p>
             <a:fld id="{7880F47B-3C72-48E5-9CD2-8B9AE0E9AFF7}" type="datetimeFigureOut">
               <a:rPr lang="en-US" smtClean="0"/>
-              <a:t>9/27/2018</a:t>
+              <a:t>9/28/2018</a:t>
             </a:fld>
             <a:endParaRPr lang="en-US"/>
           </a:p>
@@ -2816,7 +2816,7 @@
           <a:p>
             <a:fld id="{7880F47B-3C72-48E5-9CD2-8B9AE0E9AFF7}" type="datetimeFigureOut">
               <a:rPr lang="en-US" smtClean="0"/>
-              <a:t>9/27/2018</a:t>
+              <a:t>9/28/2018</a:t>
             </a:fld>
             <a:endParaRPr lang="en-US"/>
           </a:p>
@@ -3073,7 +3073,7 @@
           <a:p>
             <a:fld id="{7880F47B-3C72-48E5-9CD2-8B9AE0E9AFF7}" type="datetimeFigureOut">
               <a:rPr lang="en-US" smtClean="0"/>
-              <a:t>9/27/2018</a:t>
+              <a:t>9/28/2018</a:t>
             </a:fld>
             <a:endParaRPr lang="en-US"/>
           </a:p>
@@ -3286,7 +3286,7 @@
           <a:p>
             <a:fld id="{7880F47B-3C72-48E5-9CD2-8B9AE0E9AFF7}" type="datetimeFigureOut">
               <a:rPr lang="en-US" smtClean="0"/>
-              <a:t>9/27/2018</a:t>
+              <a:t>9/28/2018</a:t>
             </a:fld>
             <a:endParaRPr lang="en-US"/>
           </a:p>
@@ -3885,8 +3885,37 @@
                   <a:srgbClr val="002060"/>
                 </a:solidFill>
               </a:rPr>
-              <a:t>KNN solution:</a:t>
-            </a:r>
+              <a:t>KNN </a:t>
+            </a:r>
+            <a:r>
+              <a:rPr lang="en-US" sz="2800" dirty="0" smtClean="0">
+                <a:solidFill>
+                  <a:srgbClr val="002060"/>
+                </a:solidFill>
+              </a:rPr>
+              <a:t>solution (</a:t>
+            </a:r>
+            <a:r>
+              <a:rPr lang="en-US" sz="2800" smtClean="0">
+                <a:solidFill>
+                  <a:srgbClr val="002060"/>
+                </a:solidFill>
+              </a:rPr>
+              <a:t>for K = </a:t>
+            </a:r>
+            <a:r>
+              <a:rPr lang="en-US" sz="2800" smtClean="0">
+                <a:solidFill>
+                  <a:srgbClr val="002060"/>
+                </a:solidFill>
+              </a:rPr>
+              <a:t>3):</a:t>
+            </a:r>
+            <a:endParaRPr lang="en-US" sz="2800" dirty="0">
+              <a:solidFill>
+                <a:srgbClr val="002060"/>
+              </a:solidFill>
+            </a:endParaRPr>
           </a:p>
         </p:txBody>
       </p:sp>
@@ -3895,7 +3924,7 @@
           <p:cNvPr id="6" name="Picture 5" descr="A screen shot of a computer&#10;&#10;Description generated with very high confidence">
             <a:extLst>
               <a:ext uri="{FF2B5EF4-FFF2-40B4-BE49-F238E27FC236}">
-                <a16:creationId xmlns:a16="http://schemas.microsoft.com/office/drawing/2014/main" id="{CB94AE1B-C1DB-4687-9850-0C125823418F}"/>
+                <a16:creationId xmlns="" xmlns:a16="http://schemas.microsoft.com/office/drawing/2014/main" id="{CB94AE1B-C1DB-4687-9850-0C125823418F}"/>
               </a:ext>
             </a:extLst>
           </p:cNvPr>
@@ -3931,7 +3960,7 @@
           <p:cNvPr id="9" name="TextBox 8">
             <a:extLst>
               <a:ext uri="{FF2B5EF4-FFF2-40B4-BE49-F238E27FC236}">
-                <a16:creationId xmlns:a16="http://schemas.microsoft.com/office/drawing/2014/main" id="{9B236523-BCE8-4C08-B8B5-9520F6864E1E}"/>
+                <a16:creationId xmlns="" xmlns:a16="http://schemas.microsoft.com/office/drawing/2014/main" id="{9B236523-BCE8-4C08-B8B5-9520F6864E1E}"/>
               </a:ext>
             </a:extLst>
           </p:cNvPr>
@@ -4063,7 +4092,7 @@
           <p:cNvPr id="2" name="TextBox 1">
             <a:extLst>
               <a:ext uri="{FF2B5EF4-FFF2-40B4-BE49-F238E27FC236}">
-                <a16:creationId xmlns:a16="http://schemas.microsoft.com/office/drawing/2014/main" id="{21E152B0-09D5-454A-9ADF-2B2B89F34156}"/>
+                <a16:creationId xmlns="" xmlns:a16="http://schemas.microsoft.com/office/drawing/2014/main" id="{21E152B0-09D5-454A-9ADF-2B2B89F34156}"/>
               </a:ext>
             </a:extLst>
           </p:cNvPr>
@@ -4113,7 +4142,7 @@
           <p:cNvPr id="8" name="TextBox 7">
             <a:extLst>
               <a:ext uri="{FF2B5EF4-FFF2-40B4-BE49-F238E27FC236}">
-                <a16:creationId xmlns:a16="http://schemas.microsoft.com/office/drawing/2014/main" id="{9CF6F237-C604-4F09-A70D-83B287EF545E}"/>
+                <a16:creationId xmlns="" xmlns:a16="http://schemas.microsoft.com/office/drawing/2014/main" id="{9CF6F237-C604-4F09-A70D-83B287EF545E}"/>
               </a:ext>
             </a:extLst>
           </p:cNvPr>
@@ -4164,7 +4193,7 @@
           <p:cNvPr id="3" name="Picture 2">
             <a:extLst>
               <a:ext uri="{FF2B5EF4-FFF2-40B4-BE49-F238E27FC236}">
-                <a16:creationId xmlns:a16="http://schemas.microsoft.com/office/drawing/2014/main" id="{44433B60-1678-4E1A-8347-79EA453CE5BC}"/>
+                <a16:creationId xmlns="" xmlns:a16="http://schemas.microsoft.com/office/drawing/2014/main" id="{44433B60-1678-4E1A-8347-79EA453CE5BC}"/>
               </a:ext>
             </a:extLst>
           </p:cNvPr>
@@ -4361,7 +4390,7 @@
           <p:cNvPr id="2" name="TextBox 1">
             <a:extLst>
               <a:ext uri="{FF2B5EF4-FFF2-40B4-BE49-F238E27FC236}">
-                <a16:creationId xmlns:a16="http://schemas.microsoft.com/office/drawing/2014/main" id="{21E152B0-09D5-454A-9ADF-2B2B89F34156}"/>
+                <a16:creationId xmlns="" xmlns:a16="http://schemas.microsoft.com/office/drawing/2014/main" id="{21E152B0-09D5-454A-9ADF-2B2B89F34156}"/>
               </a:ext>
             </a:extLst>
           </p:cNvPr>
@@ -4401,7 +4430,7 @@
           <p:cNvPr id="9" name="Group 8">
             <a:extLst>
               <a:ext uri="{FF2B5EF4-FFF2-40B4-BE49-F238E27FC236}">
-                <a16:creationId xmlns:a16="http://schemas.microsoft.com/office/drawing/2014/main" id="{CEC1E94B-7EFB-44C6-87FD-5CE5BC04201A}"/>
+                <a16:creationId xmlns="" xmlns:a16="http://schemas.microsoft.com/office/drawing/2014/main" id="{CEC1E94B-7EFB-44C6-87FD-5CE5BC04201A}"/>
               </a:ext>
             </a:extLst>
           </p:cNvPr>
@@ -4421,7 +4450,7 @@
             <p:cNvPr id="8" name="TextBox 7">
               <a:extLst>
                 <a:ext uri="{FF2B5EF4-FFF2-40B4-BE49-F238E27FC236}">
-                  <a16:creationId xmlns:a16="http://schemas.microsoft.com/office/drawing/2014/main" id="{9CF6F237-C604-4F09-A70D-83B287EF545E}"/>
+                  <a16:creationId xmlns="" xmlns:a16="http://schemas.microsoft.com/office/drawing/2014/main" id="{9CF6F237-C604-4F09-A70D-83B287EF545E}"/>
                 </a:ext>
               </a:extLst>
             </p:cNvPr>
@@ -4507,7 +4536,7 @@
             <p:cNvPr id="4" name="Picture 3">
               <a:extLst>
                 <a:ext uri="{FF2B5EF4-FFF2-40B4-BE49-F238E27FC236}">
-                  <a16:creationId xmlns:a16="http://schemas.microsoft.com/office/drawing/2014/main" id="{8B4E90DC-5C21-46A1-AA68-5CFDBB8D3D2F}"/>
+                  <a16:creationId xmlns="" xmlns:a16="http://schemas.microsoft.com/office/drawing/2014/main" id="{8B4E90DC-5C21-46A1-AA68-5CFDBB8D3D2F}"/>
                 </a:ext>
               </a:extLst>
             </p:cNvPr>
@@ -4537,7 +4566,7 @@
             <p:cNvPr id="7" name="Picture 6">
               <a:extLst>
                 <a:ext uri="{FF2B5EF4-FFF2-40B4-BE49-F238E27FC236}">
-                  <a16:creationId xmlns:a16="http://schemas.microsoft.com/office/drawing/2014/main" id="{100B0A44-2139-435A-9A4E-2FA145FA8FB4}"/>
+                  <a16:creationId xmlns="" xmlns:a16="http://schemas.microsoft.com/office/drawing/2014/main" id="{100B0A44-2139-435A-9A4E-2FA145FA8FB4}"/>
                 </a:ext>
               </a:extLst>
             </p:cNvPr>
@@ -4705,7 +4734,7 @@
           <p:cNvPr id="2" name="TextBox 1">
             <a:extLst>
               <a:ext uri="{FF2B5EF4-FFF2-40B4-BE49-F238E27FC236}">
-                <a16:creationId xmlns:a16="http://schemas.microsoft.com/office/drawing/2014/main" id="{21E152B0-09D5-454A-9ADF-2B2B89F34156}"/>
+                <a16:creationId xmlns="" xmlns:a16="http://schemas.microsoft.com/office/drawing/2014/main" id="{21E152B0-09D5-454A-9ADF-2B2B89F34156}"/>
               </a:ext>
             </a:extLst>
           </p:cNvPr>
@@ -4740,7 +4769,7 @@
           <p:cNvPr id="10" name="Picture 9">
             <a:extLst>
               <a:ext uri="{FF2B5EF4-FFF2-40B4-BE49-F238E27FC236}">
-                <a16:creationId xmlns:a16="http://schemas.microsoft.com/office/drawing/2014/main" id="{9C7C9471-A130-4FE8-9521-E999C9AC2BA9}"/>
+                <a16:creationId xmlns="" xmlns:a16="http://schemas.microsoft.com/office/drawing/2014/main" id="{9C7C9471-A130-4FE8-9521-E999C9AC2BA9}"/>
               </a:ext>
             </a:extLst>
           </p:cNvPr>
@@ -4770,7 +4799,7 @@
           <p:cNvPr id="11" name="TextBox 10">
             <a:extLst>
               <a:ext uri="{FF2B5EF4-FFF2-40B4-BE49-F238E27FC236}">
-                <a16:creationId xmlns:a16="http://schemas.microsoft.com/office/drawing/2014/main" id="{41E39A5E-DC20-46BD-A183-44A6BE35CADC}"/>
+                <a16:creationId xmlns="" xmlns:a16="http://schemas.microsoft.com/office/drawing/2014/main" id="{41E39A5E-DC20-46BD-A183-44A6BE35CADC}"/>
               </a:ext>
             </a:extLst>
           </p:cNvPr>
@@ -4867,7 +4896,7 @@
           <p:cNvPr id="2" name="TextBox 1">
             <a:extLst>
               <a:ext uri="{FF2B5EF4-FFF2-40B4-BE49-F238E27FC236}">
-                <a16:creationId xmlns:a16="http://schemas.microsoft.com/office/drawing/2014/main" id="{21E152B0-09D5-454A-9ADF-2B2B89F34156}"/>
+                <a16:creationId xmlns="" xmlns:a16="http://schemas.microsoft.com/office/drawing/2014/main" id="{21E152B0-09D5-454A-9ADF-2B2B89F34156}"/>
               </a:ext>
             </a:extLst>
           </p:cNvPr>
@@ -4902,7 +4931,7 @@
           <p:cNvPr id="13" name="TextBox 12">
             <a:extLst>
               <a:ext uri="{FF2B5EF4-FFF2-40B4-BE49-F238E27FC236}">
-                <a16:creationId xmlns:a16="http://schemas.microsoft.com/office/drawing/2014/main" id="{7E59873E-827A-4E05-9DA8-C67AAB74C937}"/>
+                <a16:creationId xmlns="" xmlns:a16="http://schemas.microsoft.com/office/drawing/2014/main" id="{7E59873E-827A-4E05-9DA8-C67AAB74C937}"/>
               </a:ext>
             </a:extLst>
           </p:cNvPr>
@@ -4942,14 +4971,14 @@
           </a:p>
         </p:txBody>
       </p:sp>
-      <mc:AlternateContent xmlns:mc="http://schemas.openxmlformats.org/markup-compatibility/2006">
-        <mc:Choice xmlns:a14="http://schemas.microsoft.com/office/drawing/2010/main" Requires="a14">
+      <mc:AlternateContent xmlns:mc="http://schemas.openxmlformats.org/markup-compatibility/2006" xmlns:a14="http://schemas.microsoft.com/office/drawing/2010/main">
+        <mc:Choice Requires="a14">
           <p:sp>
             <p:nvSpPr>
               <p:cNvPr id="15" name="TextBox 14">
                 <a:extLst>
                   <a:ext uri="{FF2B5EF4-FFF2-40B4-BE49-F238E27FC236}">
-                    <a16:creationId xmlns:a16="http://schemas.microsoft.com/office/drawing/2014/main" id="{BC7AA50C-D98C-4D2F-AAC8-34683D205235}"/>
+                    <a16:creationId xmlns="" xmlns:a16="http://schemas.microsoft.com/office/drawing/2014/main" id="{BC7AA50C-D98C-4D2F-AAC8-34683D205235}"/>
                   </a:ext>
                 </a:extLst>
               </p:cNvPr>
@@ -5189,7 +5218,7 @@
             </p:txBody>
           </p:sp>
         </mc:Choice>
-        <mc:Fallback>
+        <mc:Fallback xmlns="">
           <p:sp>
             <p:nvSpPr>
               <p:cNvPr id="15" name="TextBox 14">
@@ -5301,7 +5330,7 @@
           <p:cNvPr id="2" name="TextBox 1">
             <a:extLst>
               <a:ext uri="{FF2B5EF4-FFF2-40B4-BE49-F238E27FC236}">
-                <a16:creationId xmlns:a16="http://schemas.microsoft.com/office/drawing/2014/main" id="{21E152B0-09D5-454A-9ADF-2B2B89F34156}"/>
+                <a16:creationId xmlns="" xmlns:a16="http://schemas.microsoft.com/office/drawing/2014/main" id="{21E152B0-09D5-454A-9ADF-2B2B89F34156}"/>
               </a:ext>
             </a:extLst>
           </p:cNvPr>
@@ -5336,7 +5365,7 @@
           <p:cNvPr id="6" name="TextBox 5">
             <a:extLst>
               <a:ext uri="{FF2B5EF4-FFF2-40B4-BE49-F238E27FC236}">
-                <a16:creationId xmlns:a16="http://schemas.microsoft.com/office/drawing/2014/main" id="{D2FFD365-CA8C-40BE-A97E-A23880E7E5E1}"/>
+                <a16:creationId xmlns="" xmlns:a16="http://schemas.microsoft.com/office/drawing/2014/main" id="{D2FFD365-CA8C-40BE-A97E-A23880E7E5E1}"/>
               </a:ext>
             </a:extLst>
           </p:cNvPr>
@@ -5374,7 +5403,7 @@
           <p:cNvPr id="3" name="Picture 2">
             <a:extLst>
               <a:ext uri="{FF2B5EF4-FFF2-40B4-BE49-F238E27FC236}">
-                <a16:creationId xmlns:a16="http://schemas.microsoft.com/office/drawing/2014/main" id="{88EA4CD3-344E-484D-8D68-0B2A70021CA8}"/>
+                <a16:creationId xmlns="" xmlns:a16="http://schemas.microsoft.com/office/drawing/2014/main" id="{88EA4CD3-344E-484D-8D68-0B2A70021CA8}"/>
               </a:ext>
             </a:extLst>
           </p:cNvPr>
@@ -5404,7 +5433,7 @@
           <p:cNvPr id="9" name="TextBox 8">
             <a:extLst>
               <a:ext uri="{FF2B5EF4-FFF2-40B4-BE49-F238E27FC236}">
-                <a16:creationId xmlns:a16="http://schemas.microsoft.com/office/drawing/2014/main" id="{DA7C46ED-F759-4A74-A53A-ADCA14C1180E}"/>
+                <a16:creationId xmlns="" xmlns:a16="http://schemas.microsoft.com/office/drawing/2014/main" id="{DA7C46ED-F759-4A74-A53A-ADCA14C1180E}"/>
               </a:ext>
             </a:extLst>
           </p:cNvPr>
@@ -5459,7 +5488,7 @@
           <p:cNvPr id="10" name="Picture 9">
             <a:extLst>
               <a:ext uri="{FF2B5EF4-FFF2-40B4-BE49-F238E27FC236}">
-                <a16:creationId xmlns:a16="http://schemas.microsoft.com/office/drawing/2014/main" id="{F15A3594-B968-4BB4-8957-A7FFC8362FB7}"/>
+                <a16:creationId xmlns="" xmlns:a16="http://schemas.microsoft.com/office/drawing/2014/main" id="{F15A3594-B968-4BB4-8957-A7FFC8362FB7}"/>
               </a:ext>
             </a:extLst>
           </p:cNvPr>
@@ -5488,7 +5517,7 @@
           <p:cNvPr id="4" name="TextBox 3">
             <a:extLst>
               <a:ext uri="{FF2B5EF4-FFF2-40B4-BE49-F238E27FC236}">
-                <a16:creationId xmlns:a16="http://schemas.microsoft.com/office/drawing/2014/main" id="{900E3E39-0B42-4B20-8A1E-B3ECC27D16B9}"/>
+                <a16:creationId xmlns="" xmlns:a16="http://schemas.microsoft.com/office/drawing/2014/main" id="{900E3E39-0B42-4B20-8A1E-B3ECC27D16B9}"/>
               </a:ext>
             </a:extLst>
           </p:cNvPr>
@@ -5643,7 +5672,7 @@
           <p:cNvPr id="8" name="TextBox 7">
             <a:extLst>
               <a:ext uri="{FF2B5EF4-FFF2-40B4-BE49-F238E27FC236}">
-                <a16:creationId xmlns:a16="http://schemas.microsoft.com/office/drawing/2014/main" id="{6BEC0887-601F-4B97-9389-9EC9E74E9A84}"/>
+                <a16:creationId xmlns="" xmlns:a16="http://schemas.microsoft.com/office/drawing/2014/main" id="{6BEC0887-601F-4B97-9389-9EC9E74E9A84}"/>
               </a:ext>
             </a:extLst>
           </p:cNvPr>
@@ -5739,7 +5768,7 @@
           <p:cNvPr id="8" name="TextBox 7">
             <a:extLst>
               <a:ext uri="{FF2B5EF4-FFF2-40B4-BE49-F238E27FC236}">
-                <a16:creationId xmlns:a16="http://schemas.microsoft.com/office/drawing/2014/main" id="{6BEC0887-601F-4B97-9389-9EC9E74E9A84}"/>
+                <a16:creationId xmlns="" xmlns:a16="http://schemas.microsoft.com/office/drawing/2014/main" id="{6BEC0887-601F-4B97-9389-9EC9E74E9A84}"/>
               </a:ext>
             </a:extLst>
           </p:cNvPr>
@@ -5876,7 +5905,7 @@
           <p:cNvPr id="10" name="Picture 9" descr="A screen shot of a computer&#10;&#10;Description generated with very high confidence">
             <a:extLst>
               <a:ext uri="{FF2B5EF4-FFF2-40B4-BE49-F238E27FC236}">
-                <a16:creationId xmlns:a16="http://schemas.microsoft.com/office/drawing/2014/main" id="{F0D5F0FB-2762-412C-9B6A-37485259FE37}"/>
+                <a16:creationId xmlns="" xmlns:a16="http://schemas.microsoft.com/office/drawing/2014/main" id="{F0D5F0FB-2762-412C-9B6A-37485259FE37}"/>
               </a:ext>
             </a:extLst>
           </p:cNvPr>
@@ -5912,7 +5941,7 @@
           <p:cNvPr id="12" name="Picture 11" descr="A close up of a computer&#10;&#10;Description generated with high confidence">
             <a:extLst>
               <a:ext uri="{FF2B5EF4-FFF2-40B4-BE49-F238E27FC236}">
-                <a16:creationId xmlns:a16="http://schemas.microsoft.com/office/drawing/2014/main" id="{3E88B37E-2DFF-4184-83FF-BB8D3A7A130D}"/>
+                <a16:creationId xmlns="" xmlns:a16="http://schemas.microsoft.com/office/drawing/2014/main" id="{3E88B37E-2DFF-4184-83FF-BB8D3A7A130D}"/>
               </a:ext>
             </a:extLst>
           </p:cNvPr>
@@ -6010,7 +6039,7 @@
           <p:cNvPr id="8" name="TextBox 7">
             <a:extLst>
               <a:ext uri="{FF2B5EF4-FFF2-40B4-BE49-F238E27FC236}">
-                <a16:creationId xmlns:a16="http://schemas.microsoft.com/office/drawing/2014/main" id="{6BEC0887-601F-4B97-9389-9EC9E74E9A84}"/>
+                <a16:creationId xmlns="" xmlns:a16="http://schemas.microsoft.com/office/drawing/2014/main" id="{6BEC0887-601F-4B97-9389-9EC9E74E9A84}"/>
               </a:ext>
             </a:extLst>
           </p:cNvPr>
@@ -6020,7 +6049,7 @@
         <p:spPr>
           <a:xfrm>
             <a:off x="218980" y="523220"/>
-            <a:ext cx="8605531" cy="5201424"/>
+            <a:ext cx="8605531" cy="6217087"/>
           </a:xfrm>
           <a:prstGeom prst="rect">
             <a:avLst/>
@@ -6098,6 +6127,38 @@
               <a:rPr lang="en-US" sz="2200" dirty="0"/>
               <a:t>.  How well did KNN perform? </a:t>
             </a:r>
+            <a:endParaRPr lang="en-US" sz="2200" dirty="0" smtClean="0"/>
+          </a:p>
+          <a:p>
+            <a:pPr marL="800100" lvl="1" indent="-342900">
+              <a:buFont typeface="Arial" panose="020B0604020202020204" pitchFamily="34" charset="0"/>
+              <a:buChar char="•"/>
+            </a:pPr>
+            <a:r>
+              <a:rPr lang="en-US" sz="2200" dirty="0" smtClean="0"/>
+              <a:t>The answer to this is already available in the slides.</a:t>
+            </a:r>
+          </a:p>
+          <a:p>
+            <a:pPr marL="342900" indent="-342900">
+              <a:buFont typeface="Arial" panose="020B0604020202020204" pitchFamily="34" charset="0"/>
+              <a:buChar char="•"/>
+            </a:pPr>
+            <a:r>
+              <a:rPr lang="en-US" sz="2200" dirty="0" smtClean="0"/>
+              <a:t>Does performance change with different values of K?</a:t>
+            </a:r>
+          </a:p>
+          <a:p>
+            <a:pPr marL="800100" lvl="1" indent="-342900">
+              <a:buFont typeface="Arial" panose="020B0604020202020204" pitchFamily="34" charset="0"/>
+              <a:buChar char="•"/>
+            </a:pPr>
+            <a:r>
+              <a:rPr lang="en-US" sz="2200" dirty="0" smtClean="0"/>
+              <a:t>The answer to this will be posted after recitation.</a:t>
+            </a:r>
+            <a:endParaRPr lang="en-US" sz="2200" dirty="0"/>
           </a:p>
           <a:p>
             <a:endParaRPr lang="en-US" sz="2200" dirty="0"/>

</xml_diff>